<commit_message>
mais atts na API & no slide
</commit_message>
<xml_diff>
--- a/Slides/Apresentação com ordem.pptx
+++ b/Slides/Apresentação com ordem.pptx
@@ -281,7 +281,7 @@
           <a:p>
             <a:fld id="{02AC24A9-CCB6-4F8D-B8DB-C2F3692CFA5A}" type="datetimeFigureOut">
               <a:rPr lang="en-US" smtClean="0"/>
-              <a:t>10/27/2020</a:t>
+              <a:t>10/28/2020</a:t>
             </a:fld>
             <a:endParaRPr lang="en-US" dirty="0"/>
           </a:p>
@@ -651,7 +651,7 @@
           <a:p>
             <a:fld id="{02AC24A9-CCB6-4F8D-B8DB-C2F3692CFA5A}" type="datetimeFigureOut">
               <a:rPr lang="en-US" smtClean="0"/>
-              <a:t>10/27/2020</a:t>
+              <a:t>10/28/2020</a:t>
             </a:fld>
             <a:endParaRPr lang="en-US"/>
           </a:p>
@@ -860,7 +860,7 @@
           <a:p>
             <a:fld id="{02AC24A9-CCB6-4F8D-B8DB-C2F3692CFA5A}" type="datetimeFigureOut">
               <a:rPr lang="en-US" smtClean="0"/>
-              <a:t>10/27/2020</a:t>
+              <a:t>10/28/2020</a:t>
             </a:fld>
             <a:endParaRPr lang="en-US"/>
           </a:p>
@@ -1330,7 +1330,7 @@
           <a:p>
             <a:fld id="{02AC24A9-CCB6-4F8D-B8DB-C2F3692CFA5A}" type="datetimeFigureOut">
               <a:rPr lang="en-US" smtClean="0"/>
-              <a:t>10/27/2020</a:t>
+              <a:t>10/28/2020</a:t>
             </a:fld>
             <a:endParaRPr lang="en-US"/>
           </a:p>
@@ -1784,7 +1784,7 @@
           <a:p>
             <a:fld id="{02AC24A9-CCB6-4F8D-B8DB-C2F3692CFA5A}" type="datetimeFigureOut">
               <a:rPr lang="en-US" smtClean="0"/>
-              <a:t>10/27/2020</a:t>
+              <a:t>10/28/2020</a:t>
             </a:fld>
             <a:endParaRPr lang="en-US"/>
           </a:p>
@@ -2316,7 +2316,7 @@
           <a:p>
             <a:fld id="{02AC24A9-CCB6-4F8D-B8DB-C2F3692CFA5A}" type="datetimeFigureOut">
               <a:rPr lang="en-US" smtClean="0"/>
-              <a:t>10/27/2020</a:t>
+              <a:t>10/28/2020</a:t>
             </a:fld>
             <a:endParaRPr lang="en-US"/>
           </a:p>
@@ -3015,7 +3015,7 @@
           <a:p>
             <a:fld id="{02AC24A9-CCB6-4F8D-B8DB-C2F3692CFA5A}" type="datetimeFigureOut">
               <a:rPr lang="en-US" smtClean="0"/>
-              <a:t>10/27/2020</a:t>
+              <a:t>10/28/2020</a:t>
             </a:fld>
             <a:endParaRPr lang="en-US"/>
           </a:p>
@@ -3344,7 +3344,7 @@
           <a:p>
             <a:fld id="{02AC24A9-CCB6-4F8D-B8DB-C2F3692CFA5A}" type="datetimeFigureOut">
               <a:rPr lang="en-US" smtClean="0"/>
-              <a:t>10/27/2020</a:t>
+              <a:t>10/28/2020</a:t>
             </a:fld>
             <a:endParaRPr lang="en-US"/>
           </a:p>
@@ -3457,7 +3457,7 @@
           <a:p>
             <a:fld id="{02AC24A9-CCB6-4F8D-B8DB-C2F3692CFA5A}" type="datetimeFigureOut">
               <a:rPr lang="en-US" smtClean="0"/>
-              <a:t>10/27/2020</a:t>
+              <a:t>10/28/2020</a:t>
             </a:fld>
             <a:endParaRPr lang="en-US"/>
           </a:p>
@@ -3952,7 +3952,7 @@
           <a:p>
             <a:fld id="{02AC24A9-CCB6-4F8D-B8DB-C2F3692CFA5A}" type="datetimeFigureOut">
               <a:rPr lang="en-US" smtClean="0"/>
-              <a:t>10/27/2020</a:t>
+              <a:t>10/28/2020</a:t>
             </a:fld>
             <a:endParaRPr lang="en-US" dirty="0"/>
           </a:p>
@@ -4429,7 +4429,7 @@
           <a:p>
             <a:fld id="{02AC24A9-CCB6-4F8D-B8DB-C2F3692CFA5A}" type="datetimeFigureOut">
               <a:rPr lang="en-US" smtClean="0"/>
-              <a:t>10/27/2020</a:t>
+              <a:t>10/28/2020</a:t>
             </a:fld>
             <a:endParaRPr lang="en-US"/>
           </a:p>
@@ -4672,7 +4672,7 @@
           <a:p>
             <a:fld id="{02AC24A9-CCB6-4F8D-B8DB-C2F3692CFA5A}" type="datetimeFigureOut">
               <a:rPr lang="en-US" smtClean="0"/>
-              <a:t>10/27/2020</a:t>
+              <a:t>10/28/2020</a:t>
             </a:fld>
             <a:endParaRPr lang="en-US"/>
           </a:p>
@@ -15127,7 +15127,7 @@
       </p:grpSpPr>
       <p:sp>
         <p:nvSpPr>
-          <p:cNvPr id="10" name="Rectangle 9">
+          <p:cNvPr id="8" name="Rectangle 7">
             <a:extLst>
               <a:ext uri="{FF2B5EF4-FFF2-40B4-BE49-F238E27FC236}">
                 <a16:creationId xmlns:a16="http://schemas.microsoft.com/office/drawing/2014/main" id="{8D06CE56-3881-4ADA-8CEF-D18B02C242A3}"/>
@@ -15219,7 +15219,7 @@
       </p:sp>
       <p:sp>
         <p:nvSpPr>
-          <p:cNvPr id="12" name="Rectangle 11">
+          <p:cNvPr id="10" name="Rectangle 9">
             <a:extLst>
               <a:ext uri="{FF2B5EF4-FFF2-40B4-BE49-F238E27FC236}">
                 <a16:creationId xmlns:a16="http://schemas.microsoft.com/office/drawing/2014/main" id="{79F3C543-62EC-4433-9C93-A2CD8764E9B4}"/>
@@ -15315,7 +15315,7 @@
       </p:sp>
       <p:sp useBgFill="1">
         <p:nvSpPr>
-          <p:cNvPr id="14" name="Rectangle 13">
+          <p:cNvPr id="12" name="Rectangle 11">
             <a:extLst>
               <a:ext uri="{FF2B5EF4-FFF2-40B4-BE49-F238E27FC236}">
                 <a16:creationId xmlns:a16="http://schemas.microsoft.com/office/drawing/2014/main" id="{C1A1C5D3-C053-4EE9-BE1A-419B6E27CCAE}"/>
@@ -15375,7 +15375,7 @@
       </p:sp>
       <p:sp useBgFill="1">
         <p:nvSpPr>
-          <p:cNvPr id="16" name="Rectangle 15">
+          <p:cNvPr id="14" name="Rectangle 13">
             <a:extLst>
               <a:ext uri="{FF2B5EF4-FFF2-40B4-BE49-F238E27FC236}">
                 <a16:creationId xmlns:a16="http://schemas.microsoft.com/office/drawing/2014/main" id="{A3473CF9-37EB-43E7-89EF-D2D1C53D1DAC}"/>
@@ -15513,7 +15513,7 @@
       </p:sp>
       <p:sp>
         <p:nvSpPr>
-          <p:cNvPr id="18" name="Rectangle: Rounded Corners 17">
+          <p:cNvPr id="16" name="Rectangle: Rounded Corners 15">
             <a:extLst>
               <a:ext uri="{FF2B5EF4-FFF2-40B4-BE49-F238E27FC236}">
                 <a16:creationId xmlns:a16="http://schemas.microsoft.com/office/drawing/2014/main" id="{586B4EF9-43BA-4655-A6FF-1D8E21574C95}"/>
@@ -15607,10 +15607,10 @@
       </p:sp>
       <p:pic>
         <p:nvPicPr>
-          <p:cNvPr id="5" name="Imagem 4" descr="Gráfico, Histograma&#10;&#10;Descrição gerada automaticamente">
-            <a:extLst>
-              <a:ext uri="{FF2B5EF4-FFF2-40B4-BE49-F238E27FC236}">
-                <a16:creationId xmlns:a16="http://schemas.microsoft.com/office/drawing/2014/main" id="{AC12E41A-2DB6-4D40-882A-EA2C87F91AA3}"/>
+          <p:cNvPr id="3" name="Imagem 2">
+            <a:extLst>
+              <a:ext uri="{FF2B5EF4-FFF2-40B4-BE49-F238E27FC236}">
+                <a16:creationId xmlns:a16="http://schemas.microsoft.com/office/drawing/2014/main" id="{A6339E73-D319-41E8-8976-284CFEFF7673}"/>
               </a:ext>
             </a:extLst>
           </p:cNvPr>
@@ -15620,62 +15620,21 @@
           <p:nvPr/>
         </p:nvPicPr>
         <p:blipFill>
-          <a:blip r:embed="rId2">
-            <a:extLst>
-              <a:ext uri="{28A0092B-C50C-407E-A947-70E740481C1C}">
-                <a14:useLocalDpi xmlns:a14="http://schemas.microsoft.com/office/drawing/2010/main" val="0"/>
-              </a:ext>
-            </a:extLst>
-          </a:blip>
+          <a:blip r:embed="rId2"/>
           <a:stretch>
             <a:fillRect/>
           </a:stretch>
         </p:blipFill>
         <p:spPr>
           <a:xfrm>
-            <a:off x="1160444" y="2179990"/>
-            <a:ext cx="9871111" cy="4096512"/>
+            <a:off x="1219199" y="2139484"/>
+            <a:ext cx="9753602" cy="4096512"/>
           </a:xfrm>
           <a:prstGeom prst="rect">
             <a:avLst/>
           </a:prstGeom>
         </p:spPr>
       </p:pic>
-      <p:sp>
-        <p:nvSpPr>
-          <p:cNvPr id="3" name="CaixaDeTexto 2">
-            <a:extLst>
-              <a:ext uri="{FF2B5EF4-FFF2-40B4-BE49-F238E27FC236}">
-                <a16:creationId xmlns:a16="http://schemas.microsoft.com/office/drawing/2014/main" id="{E455498A-28A1-4D8A-8681-2F5CF0CBE0A8}"/>
-              </a:ext>
-            </a:extLst>
-          </p:cNvPr>
-          <p:cNvSpPr txBox="1"/>
-          <p:nvPr/>
-        </p:nvSpPr>
-        <p:spPr>
-          <a:xfrm>
-            <a:off x="9708890" y="2217836"/>
-            <a:ext cx="1818126" cy="369332"/>
-          </a:xfrm>
-          <a:prstGeom prst="rect">
-            <a:avLst/>
-          </a:prstGeom>
-          <a:noFill/>
-        </p:spPr>
-        <p:txBody>
-          <a:bodyPr wrap="none" rtlCol="0">
-            <a:spAutoFit/>
-          </a:bodyPr>
-          <a:lstStyle/>
-          <a:p>
-            <a:r>
-              <a:rPr lang="pt-BR" dirty="0"/>
-              <a:t>Gabriel Alvares</a:t>
-            </a:r>
-          </a:p>
-        </p:txBody>
-      </p:sp>
     </p:spTree>
     <p:extLst>
       <p:ext uri="{BB962C8B-B14F-4D97-AF65-F5344CB8AC3E}">

</xml_diff>